<commit_message>
AFQMCLAB -> New GpBCS s.c. cpmc VMpBCS
</commit_message>
<xml_diff>
--- a/Fortran code/Fortran_bcs_pin_ettore/Record/report_2018_5_9/SC CPMC with BCS state.pptx
+++ b/Fortran code/Fortran_bcs_pin_ettore/Record/report_2018_5_9/SC CPMC with BCS state.pptx
@@ -124,6 +124,11 @@
       </a:defRPr>
     </a:lvl9pPr>
   </p:defaultTextStyle>
+  <p:extLst>
+    <p:ext uri="{EFAFB233-063F-42B5-8137-9DF3F51BA10A}">
+      <p15:sldGuideLst xmlns:p15="http://schemas.microsoft.com/office/powerpoint/2012/main"/>
+    </p:ext>
+  </p:extLst>
 </p:presentation>
 </file>
 
@@ -2589,8 +2594,8 @@
       <dgm:prSet loTypeId="urn:microsoft.com/office/officeart/2005/8/layout/process1" loCatId="process" qsTypeId="urn:microsoft.com/office/officeart/2005/8/quickstyle/simple1" qsCatId="simple" csTypeId="urn:microsoft.com/office/officeart/2005/8/colors/accent1_2" csCatId="accent1" phldr="1"/>
       <dgm:spPr/>
     </dgm:pt>
-    <mc:AlternateContent xmlns:mc="http://schemas.openxmlformats.org/markup-compatibility/2006">
-      <mc:Choice xmlns:a14="http://schemas.microsoft.com/office/drawing/2010/main" Requires="a14">
+    <mc:AlternateContent xmlns:mc="http://schemas.openxmlformats.org/markup-compatibility/2006" xmlns:a14="http://schemas.microsoft.com/office/drawing/2010/main">
+      <mc:Choice Requires="a14">
         <dgm:pt modelId="{3A4B8ECD-246A-4823-A763-8D42F5A1F251}">
           <dgm:prSet phldrT="[文本]"/>
           <dgm:spPr/>
@@ -2679,7 +2684,7 @@
           </dgm:t>
         </dgm:pt>
       </mc:Choice>
-      <mc:Fallback>
+      <mc:Fallback xmlns="">
         <dgm:pt modelId="{3A4B8ECD-246A-4823-A763-8D42F5A1F251}">
           <dgm:prSet phldrT="[文本]"/>
           <dgm:spPr/>
@@ -2745,8 +2750,8 @@
         </a:p>
       </dgm:t>
     </dgm:pt>
-    <mc:AlternateContent xmlns:mc="http://schemas.openxmlformats.org/markup-compatibility/2006">
-      <mc:Choice xmlns:a14="http://schemas.microsoft.com/office/drawing/2010/main" Requires="a14">
+    <mc:AlternateContent xmlns:mc="http://schemas.openxmlformats.org/markup-compatibility/2006" xmlns:a14="http://schemas.microsoft.com/office/drawing/2010/main">
+      <mc:Choice Requires="a14">
         <dgm:pt modelId="{224B88A3-2CC6-4782-89DD-8254C1932D23}">
           <dgm:prSet phldrT="[文本]"/>
           <dgm:spPr/>
@@ -2860,7 +2865,7 @@
           </dgm:t>
         </dgm:pt>
       </mc:Choice>
-      <mc:Fallback>
+      <mc:Fallback xmlns="">
         <dgm:pt modelId="{224B88A3-2CC6-4782-89DD-8254C1932D23}">
           <dgm:prSet phldrT="[文本]"/>
           <dgm:spPr/>
@@ -2920,8 +2925,8 @@
         </a:p>
       </dgm:t>
     </dgm:pt>
-    <mc:AlternateContent xmlns:mc="http://schemas.openxmlformats.org/markup-compatibility/2006">
-      <mc:Choice xmlns:a14="http://schemas.microsoft.com/office/drawing/2010/main" Requires="a14">
+    <mc:AlternateContent xmlns:mc="http://schemas.openxmlformats.org/markup-compatibility/2006" xmlns:a14="http://schemas.microsoft.com/office/drawing/2010/main">
+      <mc:Choice Requires="a14">
         <dgm:pt modelId="{9BB5903D-4B8B-4A3D-8F24-D797B2DECD9A}">
           <dgm:prSet phldrT="[文本]"/>
           <dgm:spPr/>
@@ -3074,7 +3079,7 @@
           </dgm:t>
         </dgm:pt>
       </mc:Choice>
-      <mc:Fallback>
+      <mc:Fallback xmlns="">
         <dgm:pt modelId="{9BB5903D-4B8B-4A3D-8F24-D797B2DECD9A}">
           <dgm:prSet phldrT="[文本]"/>
           <dgm:spPr/>
@@ -8995,7 +9000,7 @@
           <a:p>
             <a:fld id="{44705454-841A-4D52-975D-F555F6745FB3}" type="datetimeFigureOut">
               <a:rPr lang="zh-CN" altLang="en-US" smtClean="0"/>
-              <a:t>2018/5/9 Wednesday</a:t>
+              <a:t>2019/4/21 Sunday</a:t>
             </a:fld>
             <a:endParaRPr lang="zh-CN" altLang="en-US"/>
           </a:p>
@@ -9193,7 +9198,7 @@
           <a:p>
             <a:fld id="{44705454-841A-4D52-975D-F555F6745FB3}" type="datetimeFigureOut">
               <a:rPr lang="zh-CN" altLang="en-US" smtClean="0"/>
-              <a:t>2018/5/9 Wednesday</a:t>
+              <a:t>2019/4/21 Sunday</a:t>
             </a:fld>
             <a:endParaRPr lang="zh-CN" altLang="en-US"/>
           </a:p>
@@ -9401,7 +9406,7 @@
           <a:p>
             <a:fld id="{44705454-841A-4D52-975D-F555F6745FB3}" type="datetimeFigureOut">
               <a:rPr lang="zh-CN" altLang="en-US" smtClean="0"/>
-              <a:t>2018/5/9 Wednesday</a:t>
+              <a:t>2019/4/21 Sunday</a:t>
             </a:fld>
             <a:endParaRPr lang="zh-CN" altLang="en-US"/>
           </a:p>
@@ -9599,7 +9604,7 @@
           <a:p>
             <a:fld id="{44705454-841A-4D52-975D-F555F6745FB3}" type="datetimeFigureOut">
               <a:rPr lang="zh-CN" altLang="en-US" smtClean="0"/>
-              <a:t>2018/5/9 Wednesday</a:t>
+              <a:t>2019/4/21 Sunday</a:t>
             </a:fld>
             <a:endParaRPr lang="zh-CN" altLang="en-US"/>
           </a:p>
@@ -9874,7 +9879,7 @@
           <a:p>
             <a:fld id="{44705454-841A-4D52-975D-F555F6745FB3}" type="datetimeFigureOut">
               <a:rPr lang="zh-CN" altLang="en-US" smtClean="0"/>
-              <a:t>2018/5/9 Wednesday</a:t>
+              <a:t>2019/4/21 Sunday</a:t>
             </a:fld>
             <a:endParaRPr lang="zh-CN" altLang="en-US"/>
           </a:p>
@@ -10139,7 +10144,7 @@
           <a:p>
             <a:fld id="{44705454-841A-4D52-975D-F555F6745FB3}" type="datetimeFigureOut">
               <a:rPr lang="zh-CN" altLang="en-US" smtClean="0"/>
-              <a:t>2018/5/9 Wednesday</a:t>
+              <a:t>2019/4/21 Sunday</a:t>
             </a:fld>
             <a:endParaRPr lang="zh-CN" altLang="en-US"/>
           </a:p>
@@ -10551,7 +10556,7 @@
           <a:p>
             <a:fld id="{44705454-841A-4D52-975D-F555F6745FB3}" type="datetimeFigureOut">
               <a:rPr lang="zh-CN" altLang="en-US" smtClean="0"/>
-              <a:t>2018/5/9 Wednesday</a:t>
+              <a:t>2019/4/21 Sunday</a:t>
             </a:fld>
             <a:endParaRPr lang="zh-CN" altLang="en-US"/>
           </a:p>
@@ -10692,7 +10697,7 @@
           <a:p>
             <a:fld id="{44705454-841A-4D52-975D-F555F6745FB3}" type="datetimeFigureOut">
               <a:rPr lang="zh-CN" altLang="en-US" smtClean="0"/>
-              <a:t>2018/5/9 Wednesday</a:t>
+              <a:t>2019/4/21 Sunday</a:t>
             </a:fld>
             <a:endParaRPr lang="zh-CN" altLang="en-US"/>
           </a:p>
@@ -10805,7 +10810,7 @@
           <a:p>
             <a:fld id="{44705454-841A-4D52-975D-F555F6745FB3}" type="datetimeFigureOut">
               <a:rPr lang="zh-CN" altLang="en-US" smtClean="0"/>
-              <a:t>2018/5/9 Wednesday</a:t>
+              <a:t>2019/4/21 Sunday</a:t>
             </a:fld>
             <a:endParaRPr lang="zh-CN" altLang="en-US"/>
           </a:p>
@@ -11116,7 +11121,7 @@
           <a:p>
             <a:fld id="{44705454-841A-4D52-975D-F555F6745FB3}" type="datetimeFigureOut">
               <a:rPr lang="zh-CN" altLang="en-US" smtClean="0"/>
-              <a:t>2018/5/9 Wednesday</a:t>
+              <a:t>2019/4/21 Sunday</a:t>
             </a:fld>
             <a:endParaRPr lang="zh-CN" altLang="en-US"/>
           </a:p>
@@ -11404,7 +11409,7 @@
           <a:p>
             <a:fld id="{44705454-841A-4D52-975D-F555F6745FB3}" type="datetimeFigureOut">
               <a:rPr lang="zh-CN" altLang="en-US" smtClean="0"/>
-              <a:t>2018/5/9 Wednesday</a:t>
+              <a:t>2019/4/21 Sunday</a:t>
             </a:fld>
             <a:endParaRPr lang="zh-CN" altLang="en-US"/>
           </a:p>
@@ -11645,7 +11650,7 @@
           <a:p>
             <a:fld id="{44705454-841A-4D52-975D-F555F6745FB3}" type="datetimeFigureOut">
               <a:rPr lang="zh-CN" altLang="en-US" smtClean="0"/>
-              <a:t>2018/5/9 Wednesday</a:t>
+              <a:t>2019/4/21 Sunday</a:t>
             </a:fld>
             <a:endParaRPr lang="zh-CN" altLang="en-US"/>
           </a:p>
@@ -12399,8 +12404,8 @@
           </a:prstGeom>
         </p:spPr>
       </p:pic>
-      <mc:AlternateContent xmlns:mc="http://schemas.openxmlformats.org/markup-compatibility/2006">
-        <mc:Choice xmlns:a14="http://schemas.microsoft.com/office/drawing/2010/main" Requires="a14">
+      <mc:AlternateContent xmlns:mc="http://schemas.openxmlformats.org/markup-compatibility/2006" xmlns:a14="http://schemas.microsoft.com/office/drawing/2010/main">
+        <mc:Choice Requires="a14">
           <p:sp>
             <p:nvSpPr>
               <p:cNvPr id="16" name="文本框 15">
@@ -12444,7 +12449,7 @@
                     <m:sSub>
                       <m:sSubPr>
                         <m:ctrlPr>
-                          <a:rPr lang="en-US" altLang="zh-CN" sz="2000" b="1" smtClean="0">
+                          <a:rPr lang="en-US" altLang="zh-CN" sz="2000" b="1" i="1" smtClean="0">
                             <a:latin typeface="Cambria Math" panose="02040503050406030204" pitchFamily="18" charset="0"/>
                           </a:rPr>
                         </m:ctrlPr>
@@ -12469,7 +12474,7 @@
                     <m:sSub>
                       <m:sSubPr>
                         <m:ctrlPr>
-                          <a:rPr lang="en-US" altLang="zh-CN" sz="2000" b="1" smtClean="0">
+                          <a:rPr lang="en-US" altLang="zh-CN" sz="2000" b="1" i="1" smtClean="0">
                             <a:latin typeface="Cambria Math" panose="02040503050406030204" pitchFamily="18" charset="0"/>
                           </a:rPr>
                         </m:ctrlPr>
@@ -12508,7 +12513,7 @@
             </p:txBody>
           </p:sp>
         </mc:Choice>
-        <mc:Fallback>
+        <mc:Fallback xmlns="">
           <p:sp>
             <p:nvSpPr>
               <p:cNvPr id="16" name="文本框 15">
@@ -21882,8 +21887,8 @@
           </a:p>
         </p:txBody>
       </p:sp>
-      <mc:AlternateContent xmlns:mc="http://schemas.openxmlformats.org/markup-compatibility/2006">
-        <mc:Choice xmlns:a14="http://schemas.microsoft.com/office/drawing/2010/main" Requires="a14">
+      <mc:AlternateContent xmlns:mc="http://schemas.openxmlformats.org/markup-compatibility/2006" xmlns:a14="http://schemas.microsoft.com/office/drawing/2010/main">
+        <mc:Choice Requires="a14">
           <p:sp>
             <p:nvSpPr>
               <p:cNvPr id="3" name="内容占位符 2">
@@ -22014,7 +22019,7 @@
             </p:txBody>
           </p:sp>
         </mc:Choice>
-        <mc:Fallback>
+        <mc:Fallback xmlns="">
           <p:sp>
             <p:nvSpPr>
               <p:cNvPr id="3" name="内容占位符 2">
@@ -22904,8 +22909,8 @@
           </a:p>
         </p:txBody>
       </p:sp>
-      <mc:AlternateContent xmlns:mc="http://schemas.openxmlformats.org/markup-compatibility/2006">
-        <mc:Choice xmlns:a14="http://schemas.microsoft.com/office/drawing/2010/main" Requires="a14">
+      <mc:AlternateContent xmlns:mc="http://schemas.openxmlformats.org/markup-compatibility/2006" xmlns:a14="http://schemas.microsoft.com/office/drawing/2010/main">
+        <mc:Choice Requires="a14">
           <p:sp>
             <p:nvSpPr>
               <p:cNvPr id="8" name="内容占位符 2">
@@ -23534,7 +23539,7 @@
             </p:txBody>
           </p:sp>
         </mc:Choice>
-        <mc:Fallback>
+        <mc:Fallback xmlns="">
           <p:sp>
             <p:nvSpPr>
               <p:cNvPr id="8" name="内容占位符 2">
@@ -24329,8 +24334,8 @@
           </a:prstGeom>
         </p:spPr>
       </p:pic>
-      <mc:AlternateContent xmlns:mc="http://schemas.openxmlformats.org/markup-compatibility/2006">
-        <mc:Choice xmlns:a14="http://schemas.microsoft.com/office/drawing/2010/main" Requires="a14">
+      <mc:AlternateContent xmlns:mc="http://schemas.openxmlformats.org/markup-compatibility/2006" xmlns:a14="http://schemas.microsoft.com/office/drawing/2010/main">
+        <mc:Choice Requires="a14">
           <p:sp>
             <p:nvSpPr>
               <p:cNvPr id="9" name="内容占位符 2">
@@ -24774,7 +24779,13 @@
                                 <a:rPr lang="en-US" altLang="zh-CN" b="0" i="1" smtClean="0">
                                   <a:latin typeface="Cambria Math" panose="02040503050406030204" pitchFamily="18" charset="0"/>
                                 </a:rPr>
-                                <m:t>0.964</m:t>
+                                <m:t>0</m:t>
+                              </m:r>
+                              <m:r>
+                                <a:rPr lang="en-US" altLang="zh-CN" b="0" i="1" smtClean="0">
+                                  <a:latin typeface="Cambria Math" panose="02040503050406030204" pitchFamily="18" charset="0"/>
+                                </a:rPr>
+                                <m:t>.964</m:t>
                               </m:r>
                             </m:e>
                             <m:e>
@@ -24962,7 +24973,7 @@
             </p:txBody>
           </p:sp>
         </mc:Choice>
-        <mc:Fallback>
+        <mc:Fallback xmlns="">
           <p:sp>
             <p:nvSpPr>
               <p:cNvPr id="9" name="内容占位符 2">
@@ -25417,8 +25428,8 @@
           </a:p>
         </p:txBody>
       </p:sp>
-      <mc:AlternateContent xmlns:mc="http://schemas.openxmlformats.org/markup-compatibility/2006">
-        <mc:Choice xmlns:a14="http://schemas.microsoft.com/office/drawing/2010/main" Requires="a14">
+      <mc:AlternateContent xmlns:mc="http://schemas.openxmlformats.org/markup-compatibility/2006" xmlns:a14="http://schemas.microsoft.com/office/drawing/2010/main">
+        <mc:Choice Requires="a14">
           <p:sp>
             <p:nvSpPr>
               <p:cNvPr id="3" name="内容占位符 2">
@@ -26093,13 +26104,7 @@
                           <a:rPr lang="en-US" altLang="zh-CN" b="0" i="1" smtClean="0">
                             <a:latin typeface="Cambria Math" panose="02040503050406030204" pitchFamily="18" charset="0"/>
                           </a:rPr>
-                          <m:t>𝑇</m:t>
-                        </m:r>
-                        <m:r>
-                          <a:rPr lang="en-US" altLang="zh-CN" b="0" i="1" smtClean="0">
-                            <a:latin typeface="Cambria Math" panose="02040503050406030204" pitchFamily="18" charset="0"/>
-                          </a:rPr>
-                          <m:t>𝐶</m:t>
+                          <m:t>𝑇𝐶</m:t>
                         </m:r>
                       </m:e>
                       <m:sub>
@@ -26442,7 +26447,7 @@
             </p:txBody>
           </p:sp>
         </mc:Choice>
-        <mc:Fallback>
+        <mc:Fallback xmlns="">
           <p:sp>
             <p:nvSpPr>
               <p:cNvPr id="3" name="内容占位符 2">
@@ -26573,8 +26578,8 @@
           </a:prstGeom>
         </p:spPr>
       </p:pic>
-      <mc:AlternateContent xmlns:mc="http://schemas.openxmlformats.org/markup-compatibility/2006">
-        <mc:Choice xmlns:a14="http://schemas.microsoft.com/office/drawing/2010/main" Requires="a14">
+      <mc:AlternateContent xmlns:mc="http://schemas.openxmlformats.org/markup-compatibility/2006" xmlns:a14="http://schemas.microsoft.com/office/drawing/2010/main">
+        <mc:Choice Requires="a14">
           <p:graphicFrame>
             <p:nvGraphicFramePr>
               <p:cNvPr id="17" name="图示 16">
@@ -26604,7 +26609,7 @@
             </a:graphic>
           </p:graphicFrame>
         </mc:Choice>
-        <mc:Fallback>
+        <mc:Fallback xmlns="">
           <p:graphicFrame>
             <p:nvGraphicFramePr>
               <p:cNvPr id="17" name="图示 16">
@@ -26629,7 +26634,7 @@
             </p:xfrm>
             <a:graphic>
               <a:graphicData uri="http://schemas.openxmlformats.org/drawingml/2006/diagram">
-                <dgm:relIds xmlns:dgm="http://schemas.openxmlformats.org/drawingml/2006/diagram" xmlns:r="http://schemas.openxmlformats.org/officeDocument/2006/relationships" r:dm="rId8" r:lo="rId4" r:qs="rId5" r:cs="rId6"/>
+                <dgm:relIds xmlns:dgm="http://schemas.openxmlformats.org/drawingml/2006/diagram" xmlns:r="http://schemas.openxmlformats.org/officeDocument/2006/relationships" r:dm="rId8" r:lo="rId9" r:qs="rId10" r:cs="rId11"/>
               </a:graphicData>
             </a:graphic>
           </p:graphicFrame>
@@ -26674,8 +26679,8 @@
           </a:fontRef>
         </p:style>
       </p:cxnSp>
-      <mc:AlternateContent xmlns:mc="http://schemas.openxmlformats.org/markup-compatibility/2006">
-        <mc:Choice xmlns:a14="http://schemas.microsoft.com/office/drawing/2010/main" Requires="a14">
+      <mc:AlternateContent xmlns:mc="http://schemas.openxmlformats.org/markup-compatibility/2006" xmlns:a14="http://schemas.microsoft.com/office/drawing/2010/main">
+        <mc:Choice Requires="a14">
           <p:sp>
             <p:nvSpPr>
               <p:cNvPr id="20" name="文本框 19">
@@ -26984,13 +26989,7 @@
                       <a:rPr lang="en-US" altLang="zh-CN" b="0" i="1" smtClean="0">
                         <a:latin typeface="Cambria Math" panose="02040503050406030204" pitchFamily="18" charset="0"/>
                       </a:rPr>
-                      <m:t>=</m:t>
-                    </m:r>
-                    <m:r>
-                      <a:rPr lang="en-US" altLang="zh-CN" b="0" i="1" smtClean="0">
-                        <a:latin typeface="Cambria Math" panose="02040503050406030204" pitchFamily="18" charset="0"/>
-                      </a:rPr>
-                      <m:t>0</m:t>
+                      <m:t>=0</m:t>
                     </m:r>
                   </m:oMath>
                 </a14:m>
@@ -27018,7 +27017,7 @@
             </p:txBody>
           </p:sp>
         </mc:Choice>
-        <mc:Fallback>
+        <mc:Fallback xmlns="">
           <p:sp>
             <p:nvSpPr>
               <p:cNvPr id="20" name="文本框 19">
@@ -27042,7 +27041,7 @@
                 <a:avLst/>
               </a:prstGeom>
               <a:blipFill>
-                <a:blip r:embed="rId9"/>
+                <a:blip r:embed="rId12"/>
                 <a:stretch>
                   <a:fillRect l="-693" t="-2049" b="-5738"/>
                 </a:stretch>

</xml_diff>